<commit_message>
updated the notes for the lab class
</commit_message>
<xml_diff>
--- a/assessment/assessment_introduction.pptx
+++ b/assessment/assessment_introduction.pptx
@@ -9,12 +9,11 @@
     <p:sldId id="258" r:id="rId3"/>
     <p:sldId id="260" r:id="rId4"/>
     <p:sldId id="263" r:id="rId5"/>
-    <p:sldId id="261" r:id="rId6"/>
-    <p:sldId id="262" r:id="rId7"/>
-    <p:sldId id="264" r:id="rId8"/>
-    <p:sldId id="265" r:id="rId9"/>
-    <p:sldId id="266" r:id="rId10"/>
-    <p:sldId id="267" r:id="rId11"/>
+    <p:sldId id="262" r:id="rId6"/>
+    <p:sldId id="264" r:id="rId7"/>
+    <p:sldId id="265" r:id="rId8"/>
+    <p:sldId id="266" r:id="rId9"/>
+    <p:sldId id="267" r:id="rId10"/>
   </p:sldIdLst>
   <p:sldSz cx="12192000" cy="6858000"/>
   <p:notesSz cx="6858000" cy="9144000"/>
@@ -3455,416 +3454,6 @@
 </p:sld>
 </file>
 
-<file path=ppt/slides/slide10.xml><?xml version="1.0" encoding="utf-8"?>
-<p:sld xmlns:a="http://schemas.openxmlformats.org/drawingml/2006/main" xmlns:r="http://schemas.openxmlformats.org/officeDocument/2006/relationships" xmlns:p="http://schemas.openxmlformats.org/presentationml/2006/main">
-  <p:cSld>
-    <p:spTree>
-      <p:nvGrpSpPr>
-        <p:cNvPr id="1" name=""/>
-        <p:cNvGrpSpPr/>
-        <p:nvPr/>
-      </p:nvGrpSpPr>
-      <p:grpSpPr>
-        <a:xfrm>
-          <a:off x="0" y="0"/>
-          <a:ext cx="0" cy="0"/>
-          <a:chOff x="0" y="0"/>
-          <a:chExt cx="0" cy="0"/>
-        </a:xfrm>
-      </p:grpSpPr>
-      <p:sp>
-        <p:nvSpPr>
-          <p:cNvPr id="2" name="TextBox 1">
-            <a:extLst>
-              <a:ext uri="{FF2B5EF4-FFF2-40B4-BE49-F238E27FC236}">
-                <a16:creationId xmlns:a16="http://schemas.microsoft.com/office/drawing/2014/main" id="{601598BF-2932-56AA-5624-9ABCD9ADB6F6}"/>
-              </a:ext>
-            </a:extLst>
-          </p:cNvPr>
-          <p:cNvSpPr txBox="1"/>
-          <p:nvPr/>
-        </p:nvSpPr>
-        <p:spPr>
-          <a:xfrm>
-            <a:off x="1653434" y="275573"/>
-            <a:ext cx="8246873" cy="984885"/>
-          </a:xfrm>
-          <a:prstGeom prst="rect">
-            <a:avLst/>
-          </a:prstGeom>
-          <a:noFill/>
-        </p:spPr>
-        <p:txBody>
-          <a:bodyPr wrap="none" rtlCol="0">
-            <a:spAutoFit/>
-          </a:bodyPr>
-          <a:lstStyle/>
-          <a:p>
-            <a:r>
-              <a:rPr lang="en-GB" sz="4000" b="0" i="0">
-                <a:solidFill>
-                  <a:srgbClr val="212529"/>
-                </a:solidFill>
-                <a:effectLst/>
-                <a:latin typeface="system-ui"/>
-              </a:rPr>
-              <a:t>Preparing Your Website for Submission</a:t>
-            </a:r>
-          </a:p>
-          <a:p>
-            <a:endParaRPr lang="en-GB" dirty="0"/>
-          </a:p>
-        </p:txBody>
-      </p:sp>
-      <p:sp>
-        <p:nvSpPr>
-          <p:cNvPr id="4" name="TextBox 3">
-            <a:extLst>
-              <a:ext uri="{FF2B5EF4-FFF2-40B4-BE49-F238E27FC236}">
-                <a16:creationId xmlns:a16="http://schemas.microsoft.com/office/drawing/2014/main" id="{ED6ED584-224B-C22A-EE93-4216F96487CB}"/>
-              </a:ext>
-            </a:extLst>
-          </p:cNvPr>
-          <p:cNvSpPr txBox="1"/>
-          <p:nvPr/>
-        </p:nvSpPr>
-        <p:spPr>
-          <a:xfrm>
-            <a:off x="252606" y="966592"/>
-            <a:ext cx="3340530" cy="984885"/>
-          </a:xfrm>
-          <a:prstGeom prst="rect">
-            <a:avLst/>
-          </a:prstGeom>
-          <a:noFill/>
-        </p:spPr>
-        <p:txBody>
-          <a:bodyPr wrap="none" rtlCol="0">
-            <a:spAutoFit/>
-          </a:bodyPr>
-          <a:lstStyle/>
-          <a:p>
-            <a:r>
-              <a:rPr lang="en-GB" sz="4000" b="0" i="0">
-                <a:solidFill>
-                  <a:srgbClr val="212529"/>
-                </a:solidFill>
-                <a:effectLst/>
-                <a:latin typeface="system-ui"/>
-              </a:rPr>
-              <a:t>Ensure you’ve:</a:t>
-            </a:r>
-          </a:p>
-          <a:p>
-            <a:endParaRPr lang="en-GB" dirty="0"/>
-          </a:p>
-        </p:txBody>
-      </p:sp>
-      <p:sp>
-        <p:nvSpPr>
-          <p:cNvPr id="5" name="TextBox 4">
-            <a:extLst>
-              <a:ext uri="{FF2B5EF4-FFF2-40B4-BE49-F238E27FC236}">
-                <a16:creationId xmlns:a16="http://schemas.microsoft.com/office/drawing/2014/main" id="{8D09AC3A-D573-DA5C-A26B-4731B8E924F3}"/>
-              </a:ext>
-            </a:extLst>
-          </p:cNvPr>
-          <p:cNvSpPr txBox="1"/>
-          <p:nvPr/>
-        </p:nvSpPr>
-        <p:spPr>
-          <a:xfrm>
-            <a:off x="252606" y="1951477"/>
-            <a:ext cx="10749992" cy="4708981"/>
-          </a:xfrm>
-          <a:prstGeom prst="rect">
-            <a:avLst/>
-          </a:prstGeom>
-          <a:noFill/>
-        </p:spPr>
-        <p:txBody>
-          <a:bodyPr wrap="square" rtlCol="0">
-            <a:spAutoFit/>
-          </a:bodyPr>
-          <a:lstStyle/>
-          <a:p>
-            <a:pPr marL="457200" indent="-457200" algn="l">
-              <a:buFont typeface="Wingdings" pitchFamily="2" charset="2"/>
-              <a:buChar char="ü"/>
-            </a:pPr>
-            <a:r>
-              <a:rPr lang="en-GB" sz="3000" b="0" i="0" dirty="0">
-                <a:solidFill>
-                  <a:srgbClr val="212529"/>
-                </a:solidFill>
-                <a:effectLst/>
-                <a:latin typeface="system-ui"/>
-              </a:rPr>
-              <a:t>Based your project on the structure specified in task 8.</a:t>
-            </a:r>
-          </a:p>
-          <a:p>
-            <a:pPr marL="457200" indent="-457200" algn="l">
-              <a:buFont typeface="Wingdings" pitchFamily="2" charset="2"/>
-              <a:buChar char="ü"/>
-            </a:pPr>
-            <a:r>
-              <a:rPr lang="en-GB" sz="3000" b="0" i="0" dirty="0">
-                <a:solidFill>
-                  <a:srgbClr val="212529"/>
-                </a:solidFill>
-                <a:effectLst/>
-                <a:latin typeface="system-ui"/>
-              </a:rPr>
-              <a:t>Included a </a:t>
-            </a:r>
-            <a:r>
-              <a:rPr lang="en-GB" sz="3000" b="0" i="0" dirty="0" err="1">
-                <a:solidFill>
-                  <a:srgbClr val="212529"/>
-                </a:solidFill>
-                <a:effectLst/>
-                <a:latin typeface="system-ui"/>
-              </a:rPr>
-              <a:t>package.json</a:t>
-            </a:r>
-            <a:r>
-              <a:rPr lang="en-GB" sz="3000" b="0" i="0" dirty="0">
-                <a:solidFill>
-                  <a:srgbClr val="212529"/>
-                </a:solidFill>
-                <a:effectLst/>
-                <a:latin typeface="system-ui"/>
-              </a:rPr>
-              <a:t> (generated using </a:t>
-            </a:r>
-            <a:r>
-              <a:rPr lang="en-GB" sz="3000" b="0" i="0" dirty="0" err="1">
-                <a:solidFill>
-                  <a:srgbClr val="212529"/>
-                </a:solidFill>
-                <a:effectLst/>
-                <a:latin typeface="system-ui"/>
-              </a:rPr>
-              <a:t>npm</a:t>
-            </a:r>
-            <a:r>
-              <a:rPr lang="en-GB" sz="3000" b="0" i="0" dirty="0">
-                <a:solidFill>
-                  <a:srgbClr val="212529"/>
-                </a:solidFill>
-                <a:effectLst/>
-                <a:latin typeface="system-ui"/>
-              </a:rPr>
-              <a:t> </a:t>
-            </a:r>
-            <a:r>
-              <a:rPr lang="en-GB" sz="3000" b="0" i="0" dirty="0" err="1">
-                <a:solidFill>
-                  <a:srgbClr val="212529"/>
-                </a:solidFill>
-                <a:effectLst/>
-                <a:latin typeface="system-ui"/>
-              </a:rPr>
-              <a:t>init</a:t>
-            </a:r>
-            <a:r>
-              <a:rPr lang="en-GB" sz="3000" b="0" i="0" dirty="0">
-                <a:solidFill>
-                  <a:srgbClr val="212529"/>
-                </a:solidFill>
-                <a:effectLst/>
-                <a:latin typeface="system-ui"/>
-              </a:rPr>
-              <a:t>) file in the root of your project.</a:t>
-            </a:r>
-          </a:p>
-          <a:p>
-            <a:pPr marL="457200" indent="-457200" algn="l">
-              <a:buFont typeface="Wingdings" pitchFamily="2" charset="2"/>
-              <a:buChar char="ü"/>
-            </a:pPr>
-            <a:r>
-              <a:rPr lang="en-GB" sz="3000" b="0" i="0" dirty="0">
-                <a:solidFill>
-                  <a:srgbClr val="212529"/>
-                </a:solidFill>
-                <a:effectLst/>
-                <a:latin typeface="system-ui"/>
-              </a:rPr>
-              <a:t>The </a:t>
-            </a:r>
-            <a:r>
-              <a:rPr lang="en-GB" sz="3000" b="0" i="0" dirty="0" err="1">
-                <a:solidFill>
-                  <a:srgbClr val="212529"/>
-                </a:solidFill>
-                <a:effectLst/>
-                <a:latin typeface="system-ui"/>
-              </a:rPr>
-              <a:t>package.json</a:t>
-            </a:r>
-            <a:r>
-              <a:rPr lang="en-GB" sz="3000" b="0" i="0" dirty="0">
-                <a:solidFill>
-                  <a:srgbClr val="212529"/>
-                </a:solidFill>
-                <a:effectLst/>
-                <a:latin typeface="system-ui"/>
-              </a:rPr>
-              <a:t> file must include the script "start" that will run your program (e.g., "start": "</a:t>
-            </a:r>
-            <a:r>
-              <a:rPr lang="en-GB" sz="3000" b="0" i="0" dirty="0" err="1">
-                <a:solidFill>
-                  <a:srgbClr val="212529"/>
-                </a:solidFill>
-                <a:effectLst/>
-                <a:latin typeface="system-ui"/>
-              </a:rPr>
-              <a:t>nodemon</a:t>
-            </a:r>
-            <a:r>
-              <a:rPr lang="en-GB" sz="3000" b="0" i="0" dirty="0">
-                <a:solidFill>
-                  <a:srgbClr val="212529"/>
-                </a:solidFill>
-                <a:effectLst/>
-                <a:latin typeface="system-ui"/>
-              </a:rPr>
-              <a:t> </a:t>
-            </a:r>
-            <a:r>
-              <a:rPr lang="en-GB" sz="3000" b="0" i="0" dirty="0" err="1">
-                <a:solidFill>
-                  <a:srgbClr val="212529"/>
-                </a:solidFill>
-                <a:effectLst/>
-                <a:latin typeface="system-ui"/>
-              </a:rPr>
-              <a:t>index.js</a:t>
-            </a:r>
-            <a:r>
-              <a:rPr lang="en-GB" sz="3000" b="0" i="0" dirty="0">
-                <a:solidFill>
-                  <a:srgbClr val="212529"/>
-                </a:solidFill>
-                <a:effectLst/>
-                <a:latin typeface="system-ui"/>
-              </a:rPr>
-              <a:t>").</a:t>
-            </a:r>
-          </a:p>
-          <a:p>
-            <a:pPr marL="457200" indent="-457200" algn="l">
-              <a:buFont typeface="Wingdings" pitchFamily="2" charset="2"/>
-              <a:buChar char="ü"/>
-            </a:pPr>
-            <a:r>
-              <a:rPr lang="en-GB" sz="3000" b="0" i="0" dirty="0">
-                <a:solidFill>
-                  <a:srgbClr val="212529"/>
-                </a:solidFill>
-                <a:effectLst/>
-                <a:latin typeface="system-ui"/>
-              </a:rPr>
-              <a:t>Since your dependencies are in the </a:t>
-            </a:r>
-            <a:r>
-              <a:rPr lang="en-GB" sz="3000" b="0" i="0" dirty="0" err="1">
-                <a:solidFill>
-                  <a:srgbClr val="212529"/>
-                </a:solidFill>
-                <a:effectLst/>
-                <a:latin typeface="system-ui"/>
-              </a:rPr>
-              <a:t>package.json</a:t>
-            </a:r>
-            <a:r>
-              <a:rPr lang="en-GB" sz="3000" b="0" i="0" dirty="0">
-                <a:solidFill>
-                  <a:srgbClr val="212529"/>
-                </a:solidFill>
-                <a:effectLst/>
-                <a:latin typeface="system-ui"/>
-              </a:rPr>
-              <a:t> folder, please delete your </a:t>
-            </a:r>
-            <a:r>
-              <a:rPr lang="en-GB" sz="3000" b="0" i="0" dirty="0" err="1">
-                <a:solidFill>
-                  <a:srgbClr val="212529"/>
-                </a:solidFill>
-                <a:effectLst/>
-                <a:latin typeface="system-ui"/>
-              </a:rPr>
-              <a:t>node_modules</a:t>
-            </a:r>
-            <a:r>
-              <a:rPr lang="en-GB" sz="3000" b="0" i="0" dirty="0">
-                <a:solidFill>
-                  <a:srgbClr val="212529"/>
-                </a:solidFill>
-                <a:effectLst/>
-                <a:latin typeface="system-ui"/>
-              </a:rPr>
-              <a:t> folder before submitting.</a:t>
-            </a:r>
-          </a:p>
-          <a:p>
-            <a:pPr marL="457200" indent="-457200" algn="l">
-              <a:buFont typeface="Wingdings" pitchFamily="2" charset="2"/>
-              <a:buChar char="ü"/>
-            </a:pPr>
-            <a:r>
-              <a:rPr lang="en-GB" sz="3000" b="0" i="0" dirty="0">
-                <a:solidFill>
-                  <a:srgbClr val="212529"/>
-                </a:solidFill>
-                <a:effectLst/>
-                <a:latin typeface="system-ui"/>
-              </a:rPr>
-              <a:t>Before running your program, we will run the "</a:t>
-            </a:r>
-            <a:r>
-              <a:rPr lang="en-GB" sz="3000" b="0" i="0" dirty="0" err="1">
-                <a:solidFill>
-                  <a:srgbClr val="212529"/>
-                </a:solidFill>
-                <a:effectLst/>
-                <a:latin typeface="system-ui"/>
-              </a:rPr>
-              <a:t>db_setup.sql</a:t>
-            </a:r>
-            <a:r>
-              <a:rPr lang="en-GB" sz="3000" b="0" i="0" dirty="0">
-                <a:solidFill>
-                  <a:srgbClr val="212529"/>
-                </a:solidFill>
-                <a:effectLst/>
-                <a:latin typeface="system-ui"/>
-              </a:rPr>
-              <a:t>" file; you should ensure this file is up to date.</a:t>
-            </a:r>
-          </a:p>
-          <a:p>
-            <a:endParaRPr lang="en-GB" sz="3000" dirty="0"/>
-          </a:p>
-        </p:txBody>
-      </p:sp>
-    </p:spTree>
-    <p:extLst>
-      <p:ext uri="{BB962C8B-B14F-4D97-AF65-F5344CB8AC3E}">
-        <p14:creationId xmlns:p14="http://schemas.microsoft.com/office/powerpoint/2010/main" val="809993865"/>
-      </p:ext>
-    </p:extLst>
-  </p:cSld>
-  <p:clrMapOvr>
-    <a:masterClrMapping/>
-  </p:clrMapOvr>
-</p:sld>
-</file>
-
 <file path=ppt/slides/slide2.xml><?xml version="1.0" encoding="utf-8"?>
 <p:sld xmlns:a="http://schemas.openxmlformats.org/drawingml/2006/main" xmlns:r="http://schemas.openxmlformats.org/officeDocument/2006/relationships" xmlns:p="http://schemas.openxmlformats.org/presentationml/2006/main">
   <p:cSld>
@@ -4920,8 +4509,8 @@
         </p:nvSpPr>
         <p:spPr>
           <a:xfrm>
-            <a:off x="821933" y="1296161"/>
-            <a:ext cx="10438543" cy="1885131"/>
+            <a:off x="2134362" y="1296161"/>
+            <a:ext cx="8006080" cy="1885131"/>
           </a:xfrm>
           <a:prstGeom prst="rect">
             <a:avLst/>
@@ -4948,7 +4537,7 @@
                 <a:latin typeface="Calibri"/>
                 <a:cs typeface="Calibri"/>
               </a:rPr>
-              <a:t>Part 1</a:t>
+              <a:t>Part 2</a:t>
             </a:r>
           </a:p>
           <a:p>
@@ -4959,12 +4548,10 @@
             </a:pPr>
             <a:r>
               <a:rPr lang="en-GB" sz="4400" dirty="0">
-                <a:solidFill>
-                  <a:srgbClr val="191C1F"/>
-                </a:solidFill>
-                <a:latin typeface=".SFNS-Regular_wdth_opsz171999_GRAD_wght1F40000"/>
+                <a:latin typeface="Calibri"/>
+                <a:cs typeface="Calibri"/>
               </a:rPr>
-              <a:t>Database Design and Implementation </a:t>
+              <a:t>Web Front-end to the Database </a:t>
             </a:r>
           </a:p>
           <a:p>
@@ -4974,18 +4561,15 @@
               </a:lnSpc>
             </a:pPr>
             <a:r>
-              <a:rPr lang="en-GB" sz="4400" dirty="0">
+              <a:rPr lang="en-GB" sz="4400" b="0" i="0" dirty="0">
                 <a:solidFill>
-                  <a:srgbClr val="191C1F"/>
+                  <a:srgbClr val="212529"/>
                 </a:solidFill>
-                <a:latin typeface=".SFNS-Regular_wdth_opsz171999_GRAD_wght1F40000"/>
+                <a:effectLst/>
+                <a:latin typeface="system-ui"/>
               </a:rPr>
-              <a:t>[65 Marks]</a:t>
-            </a:r>
-            <a:endParaRPr sz="4400" dirty="0">
-              <a:latin typeface="Calibri"/>
-              <a:cs typeface="Calibri"/>
-            </a:endParaRPr>
+              <a:t>[35 Marks]</a:t>
+            </a:r>
           </a:p>
         </p:txBody>
       </p:sp>
@@ -5048,7 +4632,7 @@
     </p:spTree>
     <p:extLst>
       <p:ext uri="{BB962C8B-B14F-4D97-AF65-F5344CB8AC3E}">
-        <p14:creationId xmlns:p14="http://schemas.microsoft.com/office/powerpoint/2010/main" val="1978353200"/>
+        <p14:creationId xmlns:p14="http://schemas.microsoft.com/office/powerpoint/2010/main" val="1623896214"/>
       </p:ext>
     </p:extLst>
   </p:cSld>
@@ -5077,164 +4661,6 @@
       </p:grpSpPr>
       <p:sp>
         <p:nvSpPr>
-          <p:cNvPr id="2" name="object 2"/>
-          <p:cNvSpPr txBox="1"/>
-          <p:nvPr/>
-        </p:nvSpPr>
-        <p:spPr>
-          <a:xfrm>
-            <a:off x="2134362" y="1296161"/>
-            <a:ext cx="8006080" cy="1885131"/>
-          </a:xfrm>
-          <a:prstGeom prst="rect">
-            <a:avLst/>
-          </a:prstGeom>
-          <a:ln w="28575">
-            <a:solidFill>
-              <a:srgbClr val="B59B0C"/>
-            </a:solidFill>
-          </a:ln>
-        </p:spPr>
-        <p:txBody>
-          <a:bodyPr vert="horz" wrap="square" lIns="0" tIns="0" rIns="0" bIns="0" rtlCol="0">
-            <a:spAutoFit/>
-          </a:bodyPr>
-          <a:lstStyle/>
-          <a:p>
-            <a:pPr algn="ctr">
-              <a:lnSpc>
-                <a:spcPts val="4870"/>
-              </a:lnSpc>
-            </a:pPr>
-            <a:r>
-              <a:rPr lang="en-GB" sz="4400" dirty="0">
-                <a:latin typeface="Calibri"/>
-                <a:cs typeface="Calibri"/>
-              </a:rPr>
-              <a:t>Part 2</a:t>
-            </a:r>
-          </a:p>
-          <a:p>
-            <a:pPr algn="ctr">
-              <a:lnSpc>
-                <a:spcPts val="4870"/>
-              </a:lnSpc>
-            </a:pPr>
-            <a:r>
-              <a:rPr lang="en-GB" sz="4400" dirty="0">
-                <a:latin typeface="Calibri"/>
-                <a:cs typeface="Calibri"/>
-              </a:rPr>
-              <a:t>Web Front-end to the Database </a:t>
-            </a:r>
-          </a:p>
-          <a:p>
-            <a:pPr algn="ctr">
-              <a:lnSpc>
-                <a:spcPts val="4870"/>
-              </a:lnSpc>
-            </a:pPr>
-            <a:r>
-              <a:rPr lang="en-GB" sz="4400" b="0" i="0" dirty="0">
-                <a:solidFill>
-                  <a:srgbClr val="212529"/>
-                </a:solidFill>
-                <a:effectLst/>
-                <a:latin typeface="system-ui"/>
-              </a:rPr>
-              <a:t>[35 Marks]</a:t>
-            </a:r>
-          </a:p>
-        </p:txBody>
-      </p:sp>
-      <p:sp>
-        <p:nvSpPr>
-          <p:cNvPr id="6" name="object 6"/>
-          <p:cNvSpPr txBox="1">
-            <a:spLocks noGrp="1"/>
-          </p:cNvSpPr>
-          <p:nvPr>
-            <p:ph type="sldNum" sz="quarter" idx="7"/>
-          </p:nvPr>
-        </p:nvSpPr>
-        <p:spPr>
-          <a:xfrm>
-            <a:off x="8587485" y="6522338"/>
-            <a:ext cx="287020" cy="224790"/>
-          </a:xfrm>
-          <a:prstGeom prst="rect">
-            <a:avLst/>
-          </a:prstGeom>
-        </p:spPr>
-        <p:txBody>
-          <a:bodyPr vert="horz" wrap="square" lIns="0" tIns="0" rIns="0" bIns="0" rtlCol="0">
-            <a:spAutoFit/>
-          </a:bodyPr>
-          <a:lstStyle>
-            <a:defPPr>
-              <a:defRPr kern="0"/>
-            </a:defPPr>
-            <a:lvl1pPr>
-              <a:defRPr sz="1400" b="0" i="0">
-                <a:solidFill>
-                  <a:schemeClr val="tx1"/>
-                </a:solidFill>
-                <a:latin typeface="Arial"/>
-                <a:cs typeface="Arial"/>
-              </a:defRPr>
-            </a:lvl1pPr>
-          </a:lstStyle>
-          <a:p>
-            <a:pPr marL="38100">
-              <a:lnSpc>
-                <a:spcPts val="1650"/>
-              </a:lnSpc>
-            </a:pPr>
-            <a:fld id="{81D60167-4931-47E6-BA6A-407CBD079E47}" type="slidenum">
-              <a:rPr lang="en-GB" spc="-25" smtClean="0"/>
-              <a:pPr marL="38100">
-                <a:lnSpc>
-                  <a:spcPts val="1650"/>
-                </a:lnSpc>
-              </a:pPr>
-              <a:t>6</a:t>
-            </a:fld>
-            <a:endParaRPr spc="-25" dirty="0"/>
-          </a:p>
-        </p:txBody>
-      </p:sp>
-    </p:spTree>
-    <p:extLst>
-      <p:ext uri="{BB962C8B-B14F-4D97-AF65-F5344CB8AC3E}">
-        <p14:creationId xmlns:p14="http://schemas.microsoft.com/office/powerpoint/2010/main" val="1623896214"/>
-      </p:ext>
-    </p:extLst>
-  </p:cSld>
-  <p:clrMapOvr>
-    <a:masterClrMapping/>
-  </p:clrMapOvr>
-</p:sld>
-</file>
-
-<file path=ppt/slides/slide7.xml><?xml version="1.0" encoding="utf-8"?>
-<p:sld xmlns:a="http://schemas.openxmlformats.org/drawingml/2006/main" xmlns:r="http://schemas.openxmlformats.org/officeDocument/2006/relationships" xmlns:p="http://schemas.openxmlformats.org/presentationml/2006/main">
-  <p:cSld>
-    <p:spTree>
-      <p:nvGrpSpPr>
-        <p:cNvPr id="1" name=""/>
-        <p:cNvGrpSpPr/>
-        <p:nvPr/>
-      </p:nvGrpSpPr>
-      <p:grpSpPr>
-        <a:xfrm>
-          <a:off x="0" y="0"/>
-          <a:ext cx="0" cy="0"/>
-          <a:chOff x="0" y="0"/>
-          <a:chExt cx="0" cy="0"/>
-        </a:xfrm>
-      </p:grpSpPr>
-      <p:sp>
-        <p:nvSpPr>
           <p:cNvPr id="2" name="TextBox 1">
             <a:extLst>
               <a:ext uri="{FF2B5EF4-FFF2-40B4-BE49-F238E27FC236}">
@@ -5342,7 +4768,7 @@
 </p:sld>
 </file>
 
-<file path=ppt/slides/slide8.xml><?xml version="1.0" encoding="utf-8"?>
+<file path=ppt/slides/slide7.xml><?xml version="1.0" encoding="utf-8"?>
 <p:sld xmlns:a="http://schemas.openxmlformats.org/drawingml/2006/main" xmlns:r="http://schemas.openxmlformats.org/officeDocument/2006/relationships" xmlns:p="http://schemas.openxmlformats.org/presentationml/2006/main">
   <p:cSld>
     <p:bg>
@@ -5708,7 +5134,7 @@
 </p:sld>
 </file>
 
-<file path=ppt/slides/slide9.xml><?xml version="1.0" encoding="utf-8"?>
+<file path=ppt/slides/slide8.xml><?xml version="1.0" encoding="utf-8"?>
 <p:sld xmlns:a="http://schemas.openxmlformats.org/drawingml/2006/main" xmlns:r="http://schemas.openxmlformats.org/officeDocument/2006/relationships" xmlns:p="http://schemas.openxmlformats.org/presentationml/2006/main">
   <p:cSld>
     <p:bg>
@@ -5867,6 +5293,416 @@
     <p:extLst>
       <p:ext uri="{BB962C8B-B14F-4D97-AF65-F5344CB8AC3E}">
         <p14:creationId xmlns:p14="http://schemas.microsoft.com/office/powerpoint/2010/main" val="21094142"/>
+      </p:ext>
+    </p:extLst>
+  </p:cSld>
+  <p:clrMapOvr>
+    <a:masterClrMapping/>
+  </p:clrMapOvr>
+</p:sld>
+</file>
+
+<file path=ppt/slides/slide9.xml><?xml version="1.0" encoding="utf-8"?>
+<p:sld xmlns:a="http://schemas.openxmlformats.org/drawingml/2006/main" xmlns:r="http://schemas.openxmlformats.org/officeDocument/2006/relationships" xmlns:p="http://schemas.openxmlformats.org/presentationml/2006/main">
+  <p:cSld>
+    <p:spTree>
+      <p:nvGrpSpPr>
+        <p:cNvPr id="1" name=""/>
+        <p:cNvGrpSpPr/>
+        <p:nvPr/>
+      </p:nvGrpSpPr>
+      <p:grpSpPr>
+        <a:xfrm>
+          <a:off x="0" y="0"/>
+          <a:ext cx="0" cy="0"/>
+          <a:chOff x="0" y="0"/>
+          <a:chExt cx="0" cy="0"/>
+        </a:xfrm>
+      </p:grpSpPr>
+      <p:sp>
+        <p:nvSpPr>
+          <p:cNvPr id="2" name="TextBox 1">
+            <a:extLst>
+              <a:ext uri="{FF2B5EF4-FFF2-40B4-BE49-F238E27FC236}">
+                <a16:creationId xmlns:a16="http://schemas.microsoft.com/office/drawing/2014/main" id="{601598BF-2932-56AA-5624-9ABCD9ADB6F6}"/>
+              </a:ext>
+            </a:extLst>
+          </p:cNvPr>
+          <p:cNvSpPr txBox="1"/>
+          <p:nvPr/>
+        </p:nvSpPr>
+        <p:spPr>
+          <a:xfrm>
+            <a:off x="1653434" y="275573"/>
+            <a:ext cx="8246873" cy="984885"/>
+          </a:xfrm>
+          <a:prstGeom prst="rect">
+            <a:avLst/>
+          </a:prstGeom>
+          <a:noFill/>
+        </p:spPr>
+        <p:txBody>
+          <a:bodyPr wrap="none" rtlCol="0">
+            <a:spAutoFit/>
+          </a:bodyPr>
+          <a:lstStyle/>
+          <a:p>
+            <a:r>
+              <a:rPr lang="en-GB" sz="4000" b="0" i="0">
+                <a:solidFill>
+                  <a:srgbClr val="212529"/>
+                </a:solidFill>
+                <a:effectLst/>
+                <a:latin typeface="system-ui"/>
+              </a:rPr>
+              <a:t>Preparing Your Website for Submission</a:t>
+            </a:r>
+          </a:p>
+          <a:p>
+            <a:endParaRPr lang="en-GB" dirty="0"/>
+          </a:p>
+        </p:txBody>
+      </p:sp>
+      <p:sp>
+        <p:nvSpPr>
+          <p:cNvPr id="4" name="TextBox 3">
+            <a:extLst>
+              <a:ext uri="{FF2B5EF4-FFF2-40B4-BE49-F238E27FC236}">
+                <a16:creationId xmlns:a16="http://schemas.microsoft.com/office/drawing/2014/main" id="{ED6ED584-224B-C22A-EE93-4216F96487CB}"/>
+              </a:ext>
+            </a:extLst>
+          </p:cNvPr>
+          <p:cNvSpPr txBox="1"/>
+          <p:nvPr/>
+        </p:nvSpPr>
+        <p:spPr>
+          <a:xfrm>
+            <a:off x="252606" y="966592"/>
+            <a:ext cx="3340530" cy="984885"/>
+          </a:xfrm>
+          <a:prstGeom prst="rect">
+            <a:avLst/>
+          </a:prstGeom>
+          <a:noFill/>
+        </p:spPr>
+        <p:txBody>
+          <a:bodyPr wrap="none" rtlCol="0">
+            <a:spAutoFit/>
+          </a:bodyPr>
+          <a:lstStyle/>
+          <a:p>
+            <a:r>
+              <a:rPr lang="en-GB" sz="4000" b="0" i="0">
+                <a:solidFill>
+                  <a:srgbClr val="212529"/>
+                </a:solidFill>
+                <a:effectLst/>
+                <a:latin typeface="system-ui"/>
+              </a:rPr>
+              <a:t>Ensure you’ve:</a:t>
+            </a:r>
+          </a:p>
+          <a:p>
+            <a:endParaRPr lang="en-GB" dirty="0"/>
+          </a:p>
+        </p:txBody>
+      </p:sp>
+      <p:sp>
+        <p:nvSpPr>
+          <p:cNvPr id="5" name="TextBox 4">
+            <a:extLst>
+              <a:ext uri="{FF2B5EF4-FFF2-40B4-BE49-F238E27FC236}">
+                <a16:creationId xmlns:a16="http://schemas.microsoft.com/office/drawing/2014/main" id="{8D09AC3A-D573-DA5C-A26B-4731B8E924F3}"/>
+              </a:ext>
+            </a:extLst>
+          </p:cNvPr>
+          <p:cNvSpPr txBox="1"/>
+          <p:nvPr/>
+        </p:nvSpPr>
+        <p:spPr>
+          <a:xfrm>
+            <a:off x="252606" y="1951477"/>
+            <a:ext cx="10749992" cy="4708981"/>
+          </a:xfrm>
+          <a:prstGeom prst="rect">
+            <a:avLst/>
+          </a:prstGeom>
+          <a:noFill/>
+        </p:spPr>
+        <p:txBody>
+          <a:bodyPr wrap="square" rtlCol="0">
+            <a:spAutoFit/>
+          </a:bodyPr>
+          <a:lstStyle/>
+          <a:p>
+            <a:pPr marL="457200" indent="-457200" algn="l">
+              <a:buFont typeface="Wingdings" pitchFamily="2" charset="2"/>
+              <a:buChar char="ü"/>
+            </a:pPr>
+            <a:r>
+              <a:rPr lang="en-GB" sz="3000" b="0" i="0" dirty="0">
+                <a:solidFill>
+                  <a:srgbClr val="212529"/>
+                </a:solidFill>
+                <a:effectLst/>
+                <a:latin typeface="system-ui"/>
+              </a:rPr>
+              <a:t>Based your project on the structure specified in task 8.</a:t>
+            </a:r>
+          </a:p>
+          <a:p>
+            <a:pPr marL="457200" indent="-457200" algn="l">
+              <a:buFont typeface="Wingdings" pitchFamily="2" charset="2"/>
+              <a:buChar char="ü"/>
+            </a:pPr>
+            <a:r>
+              <a:rPr lang="en-GB" sz="3000" b="0" i="0" dirty="0">
+                <a:solidFill>
+                  <a:srgbClr val="212529"/>
+                </a:solidFill>
+                <a:effectLst/>
+                <a:latin typeface="system-ui"/>
+              </a:rPr>
+              <a:t>Included a </a:t>
+            </a:r>
+            <a:r>
+              <a:rPr lang="en-GB" sz="3000" b="0" i="0" dirty="0" err="1">
+                <a:solidFill>
+                  <a:srgbClr val="212529"/>
+                </a:solidFill>
+                <a:effectLst/>
+                <a:latin typeface="system-ui"/>
+              </a:rPr>
+              <a:t>package.json</a:t>
+            </a:r>
+            <a:r>
+              <a:rPr lang="en-GB" sz="3000" b="0" i="0" dirty="0">
+                <a:solidFill>
+                  <a:srgbClr val="212529"/>
+                </a:solidFill>
+                <a:effectLst/>
+                <a:latin typeface="system-ui"/>
+              </a:rPr>
+              <a:t> (generated using </a:t>
+            </a:r>
+            <a:r>
+              <a:rPr lang="en-GB" sz="3000" b="0" i="0" dirty="0" err="1">
+                <a:solidFill>
+                  <a:srgbClr val="212529"/>
+                </a:solidFill>
+                <a:effectLst/>
+                <a:latin typeface="system-ui"/>
+              </a:rPr>
+              <a:t>npm</a:t>
+            </a:r>
+            <a:r>
+              <a:rPr lang="en-GB" sz="3000" b="0" i="0" dirty="0">
+                <a:solidFill>
+                  <a:srgbClr val="212529"/>
+                </a:solidFill>
+                <a:effectLst/>
+                <a:latin typeface="system-ui"/>
+              </a:rPr>
+              <a:t> </a:t>
+            </a:r>
+            <a:r>
+              <a:rPr lang="en-GB" sz="3000" b="0" i="0" dirty="0" err="1">
+                <a:solidFill>
+                  <a:srgbClr val="212529"/>
+                </a:solidFill>
+                <a:effectLst/>
+                <a:latin typeface="system-ui"/>
+              </a:rPr>
+              <a:t>init</a:t>
+            </a:r>
+            <a:r>
+              <a:rPr lang="en-GB" sz="3000" b="0" i="0" dirty="0">
+                <a:solidFill>
+                  <a:srgbClr val="212529"/>
+                </a:solidFill>
+                <a:effectLst/>
+                <a:latin typeface="system-ui"/>
+              </a:rPr>
+              <a:t>) file in the root of your project.</a:t>
+            </a:r>
+          </a:p>
+          <a:p>
+            <a:pPr marL="457200" indent="-457200" algn="l">
+              <a:buFont typeface="Wingdings" pitchFamily="2" charset="2"/>
+              <a:buChar char="ü"/>
+            </a:pPr>
+            <a:r>
+              <a:rPr lang="en-GB" sz="3000" b="0" i="0" dirty="0">
+                <a:solidFill>
+                  <a:srgbClr val="212529"/>
+                </a:solidFill>
+                <a:effectLst/>
+                <a:latin typeface="system-ui"/>
+              </a:rPr>
+              <a:t>The </a:t>
+            </a:r>
+            <a:r>
+              <a:rPr lang="en-GB" sz="3000" b="0" i="0" dirty="0" err="1">
+                <a:solidFill>
+                  <a:srgbClr val="212529"/>
+                </a:solidFill>
+                <a:effectLst/>
+                <a:latin typeface="system-ui"/>
+              </a:rPr>
+              <a:t>package.json</a:t>
+            </a:r>
+            <a:r>
+              <a:rPr lang="en-GB" sz="3000" b="0" i="0" dirty="0">
+                <a:solidFill>
+                  <a:srgbClr val="212529"/>
+                </a:solidFill>
+                <a:effectLst/>
+                <a:latin typeface="system-ui"/>
+              </a:rPr>
+              <a:t> file must include the script "start" that will run your program (e.g., "start": "</a:t>
+            </a:r>
+            <a:r>
+              <a:rPr lang="en-GB" sz="3000" b="0" i="0" dirty="0" err="1">
+                <a:solidFill>
+                  <a:srgbClr val="212529"/>
+                </a:solidFill>
+                <a:effectLst/>
+                <a:latin typeface="system-ui"/>
+              </a:rPr>
+              <a:t>nodemon</a:t>
+            </a:r>
+            <a:r>
+              <a:rPr lang="en-GB" sz="3000" b="0" i="0" dirty="0">
+                <a:solidFill>
+                  <a:srgbClr val="212529"/>
+                </a:solidFill>
+                <a:effectLst/>
+                <a:latin typeface="system-ui"/>
+              </a:rPr>
+              <a:t> </a:t>
+            </a:r>
+            <a:r>
+              <a:rPr lang="en-GB" sz="3000" b="0" i="0" dirty="0" err="1">
+                <a:solidFill>
+                  <a:srgbClr val="212529"/>
+                </a:solidFill>
+                <a:effectLst/>
+                <a:latin typeface="system-ui"/>
+              </a:rPr>
+              <a:t>index.js</a:t>
+            </a:r>
+            <a:r>
+              <a:rPr lang="en-GB" sz="3000" b="0" i="0" dirty="0">
+                <a:solidFill>
+                  <a:srgbClr val="212529"/>
+                </a:solidFill>
+                <a:effectLst/>
+                <a:latin typeface="system-ui"/>
+              </a:rPr>
+              <a:t>").</a:t>
+            </a:r>
+          </a:p>
+          <a:p>
+            <a:pPr marL="457200" indent="-457200" algn="l">
+              <a:buFont typeface="Wingdings" pitchFamily="2" charset="2"/>
+              <a:buChar char="ü"/>
+            </a:pPr>
+            <a:r>
+              <a:rPr lang="en-GB" sz="3000" b="0" i="0" dirty="0">
+                <a:solidFill>
+                  <a:srgbClr val="212529"/>
+                </a:solidFill>
+                <a:effectLst/>
+                <a:latin typeface="system-ui"/>
+              </a:rPr>
+              <a:t>Since your dependencies are in the </a:t>
+            </a:r>
+            <a:r>
+              <a:rPr lang="en-GB" sz="3000" b="0" i="0" dirty="0" err="1">
+                <a:solidFill>
+                  <a:srgbClr val="212529"/>
+                </a:solidFill>
+                <a:effectLst/>
+                <a:latin typeface="system-ui"/>
+              </a:rPr>
+              <a:t>package.json</a:t>
+            </a:r>
+            <a:r>
+              <a:rPr lang="en-GB" sz="3000" b="0" i="0" dirty="0">
+                <a:solidFill>
+                  <a:srgbClr val="212529"/>
+                </a:solidFill>
+                <a:effectLst/>
+                <a:latin typeface="system-ui"/>
+              </a:rPr>
+              <a:t> folder, please delete your </a:t>
+            </a:r>
+            <a:r>
+              <a:rPr lang="en-GB" sz="3000" b="0" i="0" dirty="0" err="1">
+                <a:solidFill>
+                  <a:srgbClr val="212529"/>
+                </a:solidFill>
+                <a:effectLst/>
+                <a:latin typeface="system-ui"/>
+              </a:rPr>
+              <a:t>node_modules</a:t>
+            </a:r>
+            <a:r>
+              <a:rPr lang="en-GB" sz="3000" b="0" i="0" dirty="0">
+                <a:solidFill>
+                  <a:srgbClr val="212529"/>
+                </a:solidFill>
+                <a:effectLst/>
+                <a:latin typeface="system-ui"/>
+              </a:rPr>
+              <a:t> folder before submitting.</a:t>
+            </a:r>
+          </a:p>
+          <a:p>
+            <a:pPr marL="457200" indent="-457200" algn="l">
+              <a:buFont typeface="Wingdings" pitchFamily="2" charset="2"/>
+              <a:buChar char="ü"/>
+            </a:pPr>
+            <a:r>
+              <a:rPr lang="en-GB" sz="3000" b="0" i="0" dirty="0">
+                <a:solidFill>
+                  <a:srgbClr val="212529"/>
+                </a:solidFill>
+                <a:effectLst/>
+                <a:latin typeface="system-ui"/>
+              </a:rPr>
+              <a:t>Before running your program, we will run the "</a:t>
+            </a:r>
+            <a:r>
+              <a:rPr lang="en-GB" sz="3000" b="0" i="0" dirty="0" err="1">
+                <a:solidFill>
+                  <a:srgbClr val="212529"/>
+                </a:solidFill>
+                <a:effectLst/>
+                <a:latin typeface="system-ui"/>
+              </a:rPr>
+              <a:t>db_setup.sql</a:t>
+            </a:r>
+            <a:r>
+              <a:rPr lang="en-GB" sz="3000" b="0" i="0" dirty="0">
+                <a:solidFill>
+                  <a:srgbClr val="212529"/>
+                </a:solidFill>
+                <a:effectLst/>
+                <a:latin typeface="system-ui"/>
+              </a:rPr>
+              <a:t>" file; you should ensure this file is up to date.</a:t>
+            </a:r>
+          </a:p>
+          <a:p>
+            <a:endParaRPr lang="en-GB" sz="3000" dirty="0"/>
+          </a:p>
+        </p:txBody>
+      </p:sp>
+    </p:spTree>
+    <p:extLst>
+      <p:ext uri="{BB962C8B-B14F-4D97-AF65-F5344CB8AC3E}">
+        <p14:creationId xmlns:p14="http://schemas.microsoft.com/office/powerpoint/2010/main" val="809993865"/>
       </p:ext>
     </p:extLst>
   </p:cSld>

</xml_diff>

<commit_message>
updated the week 9 notes and fixed typos
</commit_message>
<xml_diff>
--- a/assessment/assessment_introduction.pptx
+++ b/assessment/assessment_introduction.pptx
@@ -278,7 +278,7 @@
           <a:p>
             <a:fld id="{54C459AF-D4C2-1C45-9F57-B973339310F4}" type="datetimeFigureOut">
               <a:rPr lang="en-GB" smtClean="0"/>
-              <a:t>10/11/2023</a:t>
+              <a:t>13/11/2023</a:t>
             </a:fld>
             <a:endParaRPr lang="en-GB"/>
           </a:p>
@@ -476,7 +476,7 @@
           <a:p>
             <a:fld id="{54C459AF-D4C2-1C45-9F57-B973339310F4}" type="datetimeFigureOut">
               <a:rPr lang="en-GB" smtClean="0"/>
-              <a:t>10/11/2023</a:t>
+              <a:t>13/11/2023</a:t>
             </a:fld>
             <a:endParaRPr lang="en-GB"/>
           </a:p>
@@ -684,7 +684,7 @@
           <a:p>
             <a:fld id="{54C459AF-D4C2-1C45-9F57-B973339310F4}" type="datetimeFigureOut">
               <a:rPr lang="en-GB" smtClean="0"/>
-              <a:t>10/11/2023</a:t>
+              <a:t>13/11/2023</a:t>
             </a:fld>
             <a:endParaRPr lang="en-GB"/>
           </a:p>
@@ -882,7 +882,7 @@
           <a:p>
             <a:fld id="{54C459AF-D4C2-1C45-9F57-B973339310F4}" type="datetimeFigureOut">
               <a:rPr lang="en-GB" smtClean="0"/>
-              <a:t>10/11/2023</a:t>
+              <a:t>13/11/2023</a:t>
             </a:fld>
             <a:endParaRPr lang="en-GB"/>
           </a:p>
@@ -1157,7 +1157,7 @@
           <a:p>
             <a:fld id="{54C459AF-D4C2-1C45-9F57-B973339310F4}" type="datetimeFigureOut">
               <a:rPr lang="en-GB" smtClean="0"/>
-              <a:t>10/11/2023</a:t>
+              <a:t>13/11/2023</a:t>
             </a:fld>
             <a:endParaRPr lang="en-GB"/>
           </a:p>
@@ -1422,7 +1422,7 @@
           <a:p>
             <a:fld id="{54C459AF-D4C2-1C45-9F57-B973339310F4}" type="datetimeFigureOut">
               <a:rPr lang="en-GB" smtClean="0"/>
-              <a:t>10/11/2023</a:t>
+              <a:t>13/11/2023</a:t>
             </a:fld>
             <a:endParaRPr lang="en-GB"/>
           </a:p>
@@ -1834,7 +1834,7 @@
           <a:p>
             <a:fld id="{54C459AF-D4C2-1C45-9F57-B973339310F4}" type="datetimeFigureOut">
               <a:rPr lang="en-GB" smtClean="0"/>
-              <a:t>10/11/2023</a:t>
+              <a:t>13/11/2023</a:t>
             </a:fld>
             <a:endParaRPr lang="en-GB"/>
           </a:p>
@@ -1975,7 +1975,7 @@
           <a:p>
             <a:fld id="{54C459AF-D4C2-1C45-9F57-B973339310F4}" type="datetimeFigureOut">
               <a:rPr lang="en-GB" smtClean="0"/>
-              <a:t>10/11/2023</a:t>
+              <a:t>13/11/2023</a:t>
             </a:fld>
             <a:endParaRPr lang="en-GB"/>
           </a:p>
@@ -2088,7 +2088,7 @@
           <a:p>
             <a:fld id="{54C459AF-D4C2-1C45-9F57-B973339310F4}" type="datetimeFigureOut">
               <a:rPr lang="en-GB" smtClean="0"/>
-              <a:t>10/11/2023</a:t>
+              <a:t>13/11/2023</a:t>
             </a:fld>
             <a:endParaRPr lang="en-GB"/>
           </a:p>
@@ -2399,7 +2399,7 @@
           <a:p>
             <a:fld id="{54C459AF-D4C2-1C45-9F57-B973339310F4}" type="datetimeFigureOut">
               <a:rPr lang="en-GB" smtClean="0"/>
-              <a:t>10/11/2023</a:t>
+              <a:t>13/11/2023</a:t>
             </a:fld>
             <a:endParaRPr lang="en-GB"/>
           </a:p>
@@ -2687,7 +2687,7 @@
           <a:p>
             <a:fld id="{54C459AF-D4C2-1C45-9F57-B973339310F4}" type="datetimeFigureOut">
               <a:rPr lang="en-GB" smtClean="0"/>
-              <a:t>10/11/2023</a:t>
+              <a:t>13/11/2023</a:t>
             </a:fld>
             <a:endParaRPr lang="en-GB"/>
           </a:p>
@@ -2928,7 +2928,7 @@
           <a:p>
             <a:fld id="{54C459AF-D4C2-1C45-9F57-B973339310F4}" type="datetimeFigureOut">
               <a:rPr lang="en-GB" smtClean="0"/>
-              <a:t>10/11/2023</a:t>
+              <a:t>13/11/2023</a:t>
             </a:fld>
             <a:endParaRPr lang="en-GB"/>
           </a:p>

</xml_diff>